<commit_message>
Conclusão do desenvolvimento da Primeira versão do Projeto
</commit_message>
<xml_diff>
--- a/Documentações/Apresentação.pptx
+++ b/Documentações/Apresentação.pptx
@@ -10,6 +10,7 @@
     <p:sldId id="258" r:id="rId4"/>
     <p:sldId id="260" r:id="rId5"/>
     <p:sldId id="261" r:id="rId6"/>
+    <p:sldId id="262" r:id="rId7"/>
   </p:sldIdLst>
   <p:sldSz cx="12192000" cy="6858000"/>
   <p:notesSz cx="6858000" cy="9144000"/>
@@ -108,6 +109,11 @@
       </a:defRPr>
     </a:lvl9pPr>
   </p:defaultTextStyle>
+  <p:extLst>
+    <p:ext uri="{EFAFB233-063F-42B5-8137-9DF3F51BA10A}">
+      <p15:sldGuideLst xmlns:p15="http://schemas.microsoft.com/office/powerpoint/2012/main"/>
+    </p:ext>
+  </p:extLst>
 </p:presentation>
 </file>
 
@@ -258,7 +264,7 @@
           <a:p>
             <a:fld id="{4DF486D9-9195-4018-9B96-61A3D80AAD5B}" type="datetimeFigureOut">
               <a:rPr lang="pt-BR" smtClean="0"/>
-              <a:t>05/06/2022</a:t>
+              <a:t>06/06/2022</a:t>
             </a:fld>
             <a:endParaRPr lang="pt-BR"/>
           </a:p>
@@ -456,7 +462,7 @@
           <a:p>
             <a:fld id="{4DF486D9-9195-4018-9B96-61A3D80AAD5B}" type="datetimeFigureOut">
               <a:rPr lang="pt-BR" smtClean="0"/>
-              <a:t>05/06/2022</a:t>
+              <a:t>06/06/2022</a:t>
             </a:fld>
             <a:endParaRPr lang="pt-BR"/>
           </a:p>
@@ -664,7 +670,7 @@
           <a:p>
             <a:fld id="{4DF486D9-9195-4018-9B96-61A3D80AAD5B}" type="datetimeFigureOut">
               <a:rPr lang="pt-BR" smtClean="0"/>
-              <a:t>05/06/2022</a:t>
+              <a:t>06/06/2022</a:t>
             </a:fld>
             <a:endParaRPr lang="pt-BR"/>
           </a:p>
@@ -862,7 +868,7 @@
           <a:p>
             <a:fld id="{4DF486D9-9195-4018-9B96-61A3D80AAD5B}" type="datetimeFigureOut">
               <a:rPr lang="pt-BR" smtClean="0"/>
-              <a:t>05/06/2022</a:t>
+              <a:t>06/06/2022</a:t>
             </a:fld>
             <a:endParaRPr lang="pt-BR"/>
           </a:p>
@@ -1137,7 +1143,7 @@
           <a:p>
             <a:fld id="{4DF486D9-9195-4018-9B96-61A3D80AAD5B}" type="datetimeFigureOut">
               <a:rPr lang="pt-BR" smtClean="0"/>
-              <a:t>05/06/2022</a:t>
+              <a:t>06/06/2022</a:t>
             </a:fld>
             <a:endParaRPr lang="pt-BR"/>
           </a:p>
@@ -1402,7 +1408,7 @@
           <a:p>
             <a:fld id="{4DF486D9-9195-4018-9B96-61A3D80AAD5B}" type="datetimeFigureOut">
               <a:rPr lang="pt-BR" smtClean="0"/>
-              <a:t>05/06/2022</a:t>
+              <a:t>06/06/2022</a:t>
             </a:fld>
             <a:endParaRPr lang="pt-BR"/>
           </a:p>
@@ -1814,7 +1820,7 @@
           <a:p>
             <a:fld id="{4DF486D9-9195-4018-9B96-61A3D80AAD5B}" type="datetimeFigureOut">
               <a:rPr lang="pt-BR" smtClean="0"/>
-              <a:t>05/06/2022</a:t>
+              <a:t>06/06/2022</a:t>
             </a:fld>
             <a:endParaRPr lang="pt-BR"/>
           </a:p>
@@ -1955,7 +1961,7 @@
           <a:p>
             <a:fld id="{4DF486D9-9195-4018-9B96-61A3D80AAD5B}" type="datetimeFigureOut">
               <a:rPr lang="pt-BR" smtClean="0"/>
-              <a:t>05/06/2022</a:t>
+              <a:t>06/06/2022</a:t>
             </a:fld>
             <a:endParaRPr lang="pt-BR"/>
           </a:p>
@@ -2068,7 +2074,7 @@
           <a:p>
             <a:fld id="{4DF486D9-9195-4018-9B96-61A3D80AAD5B}" type="datetimeFigureOut">
               <a:rPr lang="pt-BR" smtClean="0"/>
-              <a:t>05/06/2022</a:t>
+              <a:t>06/06/2022</a:t>
             </a:fld>
             <a:endParaRPr lang="pt-BR"/>
           </a:p>
@@ -2379,7 +2385,7 @@
           <a:p>
             <a:fld id="{4DF486D9-9195-4018-9B96-61A3D80AAD5B}" type="datetimeFigureOut">
               <a:rPr lang="pt-BR" smtClean="0"/>
-              <a:t>05/06/2022</a:t>
+              <a:t>06/06/2022</a:t>
             </a:fld>
             <a:endParaRPr lang="pt-BR"/>
           </a:p>
@@ -2667,7 +2673,7 @@
           <a:p>
             <a:fld id="{4DF486D9-9195-4018-9B96-61A3D80AAD5B}" type="datetimeFigureOut">
               <a:rPr lang="pt-BR" smtClean="0"/>
-              <a:t>05/06/2022</a:t>
+              <a:t>06/06/2022</a:t>
             </a:fld>
             <a:endParaRPr lang="pt-BR"/>
           </a:p>
@@ -2908,7 +2914,7 @@
           <a:p>
             <a:fld id="{4DF486D9-9195-4018-9B96-61A3D80AAD5B}" type="datetimeFigureOut">
               <a:rPr lang="pt-BR" smtClean="0"/>
-              <a:t>05/06/2022</a:t>
+              <a:t>06/06/2022</a:t>
             </a:fld>
             <a:endParaRPr lang="pt-BR"/>
           </a:p>
@@ -3674,13 +3680,13 @@
   <p:clrMapOvr>
     <a:masterClrMapping/>
   </p:clrMapOvr>
-  <mc:AlternateContent xmlns:mc="http://schemas.openxmlformats.org/markup-compatibility/2006">
-    <mc:Choice xmlns:p159="http://schemas.microsoft.com/office/powerpoint/2015/09/main" Requires="p159">
+  <mc:AlternateContent xmlns:mc="http://schemas.openxmlformats.org/markup-compatibility/2006" xmlns:p159="http://schemas.microsoft.com/office/powerpoint/2015/09/main">
+    <mc:Choice Requires="p159">
       <p:transition xmlns:p14="http://schemas.microsoft.com/office/powerpoint/2010/main" spd="slow" p14:dur="2000">
         <p159:morph option="byObject"/>
       </p:transition>
     </mc:Choice>
-    <mc:Fallback>
+    <mc:Fallback xmlns="">
       <p:transition spd="slow">
         <p:fade/>
       </p:transition>
@@ -3806,7 +3812,7 @@
         </p:nvSpPr>
         <p:spPr>
           <a:xfrm>
-            <a:off x="4207566" y="2705725"/>
+            <a:off x="4128053" y="2705725"/>
             <a:ext cx="4141304" cy="1446550"/>
           </a:xfrm>
           <a:prstGeom prst="rect">
@@ -3824,7 +3830,15 @@
               <a:rPr lang="pt-BR" sz="4400" dirty="0">
                 <a:latin typeface="Bahnschrift Light SemiCondensed" panose="020B0502040204020203" pitchFamily="34" charset="0"/>
               </a:rPr>
-              <a:t>Por que a </a:t>
+              <a:t>Por que </a:t>
+            </a:r>
+          </a:p>
+          <a:p>
+            <a:r>
+              <a:rPr lang="pt-BR" sz="4400" dirty="0">
+                <a:latin typeface="Bahnschrift Light SemiCondensed" panose="020B0502040204020203" pitchFamily="34" charset="0"/>
+              </a:rPr>
+              <a:t>escolhi a </a:t>
             </a:r>
             <a:r>
               <a:rPr lang="pt-BR" sz="4400" b="1" dirty="0">
@@ -3836,11 +3850,47 @@
               <a:rPr lang="pt-BR" sz="4400" dirty="0">
                 <a:latin typeface="Bahnschrift Light SemiCondensed" panose="020B0502040204020203" pitchFamily="34" charset="0"/>
               </a:rPr>
-              <a:t> me identifica ?</a:t>
-            </a:r>
-          </a:p>
-        </p:txBody>
-      </p:sp>
+              <a:t> ?</a:t>
+            </a:r>
+          </a:p>
+        </p:txBody>
+      </p:sp>
+      <p:pic>
+        <p:nvPicPr>
+          <p:cNvPr id="4" name="Imagem 3" descr="Jovem empresário pensando">
+            <a:extLst>
+              <a:ext uri="{FF2B5EF4-FFF2-40B4-BE49-F238E27FC236}">
+                <a16:creationId xmlns:a16="http://schemas.microsoft.com/office/drawing/2014/main" id="{6ECDB5C3-220F-8EAF-B823-807B87B78C1B}"/>
+              </a:ext>
+            </a:extLst>
+          </p:cNvPr>
+          <p:cNvPicPr>
+            <a:picLocks noChangeAspect="1"/>
+          </p:cNvPicPr>
+          <p:nvPr/>
+        </p:nvPicPr>
+        <p:blipFill>
+          <a:blip r:embed="rId2">
+            <a:extLst>
+              <a:ext uri="{28A0092B-C50C-407E-A947-70E740481C1C}">
+                <a14:useLocalDpi xmlns:a14="http://schemas.microsoft.com/office/drawing/2010/main" val="0"/>
+              </a:ext>
+            </a:extLst>
+          </a:blip>
+          <a:stretch>
+            <a:fillRect/>
+          </a:stretch>
+        </p:blipFill>
+        <p:spPr>
+          <a:xfrm>
+            <a:off x="9008183" y="3631096"/>
+            <a:ext cx="1424809" cy="3226904"/>
+          </a:xfrm>
+          <a:prstGeom prst="rect">
+            <a:avLst/>
+          </a:prstGeom>
+        </p:spPr>
+      </p:pic>
     </p:spTree>
     <p:extLst>
       <p:ext uri="{BB962C8B-B14F-4D97-AF65-F5344CB8AC3E}">
@@ -3851,13 +3901,13 @@
   <p:clrMapOvr>
     <a:masterClrMapping/>
   </p:clrMapOvr>
-  <mc:AlternateContent xmlns:mc="http://schemas.openxmlformats.org/markup-compatibility/2006">
-    <mc:Choice xmlns:p14="http://schemas.microsoft.com/office/powerpoint/2010/main" Requires="p14">
+  <mc:AlternateContent xmlns:mc="http://schemas.openxmlformats.org/markup-compatibility/2006" xmlns:p14="http://schemas.microsoft.com/office/powerpoint/2010/main">
+    <mc:Choice Requires="p14">
       <p:transition spd="slow" p14:dur="800">
         <p:circle/>
       </p:transition>
     </mc:Choice>
-    <mc:Fallback>
+    <mc:Fallback xmlns="">
       <p:transition spd="slow">
         <p:circle/>
       </p:transition>
@@ -4167,6 +4217,105 @@
                       </p:childTnLst>
                     </p:cTn>
                   </p:par>
+                  <p:par>
+                    <p:cTn id="21" fill="hold">
+                      <p:stCondLst>
+                        <p:cond delay="indefinite"/>
+                      </p:stCondLst>
+                      <p:childTnLst>
+                        <p:par>
+                          <p:cTn id="22" fill="hold">
+                            <p:stCondLst>
+                              <p:cond delay="0"/>
+                            </p:stCondLst>
+                            <p:childTnLst>
+                              <p:par>
+                                <p:cTn id="23" presetID="42" presetClass="entr" presetSubtype="0" fill="hold" nodeType="clickEffect">
+                                  <p:stCondLst>
+                                    <p:cond delay="0"/>
+                                  </p:stCondLst>
+                                  <p:childTnLst>
+                                    <p:set>
+                                      <p:cBhvr>
+                                        <p:cTn id="24" dur="1" fill="hold">
+                                          <p:stCondLst>
+                                            <p:cond delay="0"/>
+                                          </p:stCondLst>
+                                        </p:cTn>
+                                        <p:tgtEl>
+                                          <p:spTgt spid="4"/>
+                                        </p:tgtEl>
+                                        <p:attrNameLst>
+                                          <p:attrName>style.visibility</p:attrName>
+                                        </p:attrNameLst>
+                                      </p:cBhvr>
+                                      <p:to>
+                                        <p:strVal val="visible"/>
+                                      </p:to>
+                                    </p:set>
+                                    <p:animEffect transition="in" filter="fade">
+                                      <p:cBhvr>
+                                        <p:cTn id="25" dur="1000"/>
+                                        <p:tgtEl>
+                                          <p:spTgt spid="4"/>
+                                        </p:tgtEl>
+                                      </p:cBhvr>
+                                    </p:animEffect>
+                                    <p:anim calcmode="lin" valueType="num">
+                                      <p:cBhvr>
+                                        <p:cTn id="26" dur="1000" fill="hold"/>
+                                        <p:tgtEl>
+                                          <p:spTgt spid="4"/>
+                                        </p:tgtEl>
+                                        <p:attrNameLst>
+                                          <p:attrName>ppt_x</p:attrName>
+                                        </p:attrNameLst>
+                                      </p:cBhvr>
+                                      <p:tavLst>
+                                        <p:tav tm="0">
+                                          <p:val>
+                                            <p:strVal val="#ppt_x"/>
+                                          </p:val>
+                                        </p:tav>
+                                        <p:tav tm="100000">
+                                          <p:val>
+                                            <p:strVal val="#ppt_x"/>
+                                          </p:val>
+                                        </p:tav>
+                                      </p:tavLst>
+                                    </p:anim>
+                                    <p:anim calcmode="lin" valueType="num">
+                                      <p:cBhvr>
+                                        <p:cTn id="27" dur="1000" fill="hold"/>
+                                        <p:tgtEl>
+                                          <p:spTgt spid="4"/>
+                                        </p:tgtEl>
+                                        <p:attrNameLst>
+                                          <p:attrName>ppt_y</p:attrName>
+                                        </p:attrNameLst>
+                                      </p:cBhvr>
+                                      <p:tavLst>
+                                        <p:tav tm="0">
+                                          <p:val>
+                                            <p:strVal val="#ppt_y+.1"/>
+                                          </p:val>
+                                        </p:tav>
+                                        <p:tav tm="100000">
+                                          <p:val>
+                                            <p:strVal val="#ppt_y"/>
+                                          </p:val>
+                                        </p:tav>
+                                      </p:tavLst>
+                                    </p:anim>
+                                  </p:childTnLst>
+                                </p:cTn>
+                              </p:par>
+                            </p:childTnLst>
+                          </p:cTn>
+                        </p:par>
+                      </p:childTnLst>
+                    </p:cTn>
+                  </p:par>
                 </p:childTnLst>
               </p:cTn>
               <p:prevCondLst>
@@ -4436,13 +4585,13 @@
   <p:clrMapOvr>
     <a:masterClrMapping/>
   </p:clrMapOvr>
-  <mc:AlternateContent xmlns:mc="http://schemas.openxmlformats.org/markup-compatibility/2006">
-    <mc:Choice xmlns:p159="http://schemas.microsoft.com/office/powerpoint/2015/09/main" Requires="p159">
+  <mc:AlternateContent xmlns:mc="http://schemas.openxmlformats.org/markup-compatibility/2006" xmlns:p159="http://schemas.microsoft.com/office/powerpoint/2015/09/main">
+    <mc:Choice Requires="p159">
       <p:transition xmlns:p14="http://schemas.microsoft.com/office/powerpoint/2010/main" spd="slow" p14:dur="2000">
         <p159:morph option="byObject"/>
       </p:transition>
     </mc:Choice>
-    <mc:Fallback>
+    <mc:Fallback xmlns="">
       <p:transition spd="slow">
         <p:fade/>
       </p:transition>
@@ -4589,6 +4738,56 @@
           <a:chExt cx="0" cy="0"/>
         </a:xfrm>
       </p:grpSpPr>
+      <p:pic>
+        <p:nvPicPr>
+          <p:cNvPr id="3" name="Imagem 2" descr="Homem escalando o rosto de pedra de sheer, segurando uma corda de escalada na montanha, combiners e mochila">
+            <a:extLst>
+              <a:ext uri="{FF2B5EF4-FFF2-40B4-BE49-F238E27FC236}">
+                <a16:creationId xmlns:a16="http://schemas.microsoft.com/office/drawing/2014/main" id="{E5B0BDE4-5551-E7F7-1EE5-93998C40AB20}"/>
+              </a:ext>
+            </a:extLst>
+          </p:cNvPr>
+          <p:cNvPicPr>
+            <a:picLocks noChangeAspect="1"/>
+          </p:cNvPicPr>
+          <p:nvPr/>
+        </p:nvPicPr>
+        <p:blipFill>
+          <a:blip r:embed="rId2">
+            <a:alphaModFix amt="65000"/>
+            <a:extLst>
+              <a:ext uri="{BEBA8EAE-BF5A-486C-A8C5-ECC9F3942E4B}">
+                <a14:imgProps xmlns:a14="http://schemas.microsoft.com/office/drawing/2010/main">
+                  <a14:imgLayer r:embed="rId3">
+                    <a14:imgEffect>
+                      <a14:artisticCutout/>
+                    </a14:imgEffect>
+                  </a14:imgLayer>
+                </a14:imgProps>
+              </a:ext>
+              <a:ext uri="{28A0092B-C50C-407E-A947-70E740481C1C}">
+                <a14:useLocalDpi xmlns:a14="http://schemas.microsoft.com/office/drawing/2010/main" val="0"/>
+              </a:ext>
+            </a:extLst>
+          </a:blip>
+          <a:stretch>
+            <a:fillRect/>
+          </a:stretch>
+        </p:blipFill>
+        <p:spPr>
+          <a:xfrm>
+            <a:off x="3242093" y="660777"/>
+            <a:ext cx="9122186" cy="6815282"/>
+          </a:xfrm>
+          <a:prstGeom prst="rect">
+            <a:avLst/>
+          </a:prstGeom>
+          <a:noFill/>
+          <a:effectLst>
+            <a:softEdge rad="1270000"/>
+          </a:effectLst>
+        </p:spPr>
+      </p:pic>
       <p:sp>
         <p:nvSpPr>
           <p:cNvPr id="21" name="Triângulo Retângulo 20">
@@ -4743,8 +4942,8 @@
         </p:nvSpPr>
         <p:spPr>
           <a:xfrm>
-            <a:off x="1258957" y="2610269"/>
-            <a:ext cx="4210034" cy="769441"/>
+            <a:off x="3604591" y="2994990"/>
+            <a:ext cx="4982817" cy="769441"/>
           </a:xfrm>
           <a:prstGeom prst="rect">
             <a:avLst/>
@@ -4759,7 +4958,7 @@
           <a:p>
             <a:r>
               <a:rPr lang="pt-BR" sz="4400" dirty="0"/>
-              <a:t>Agradecimentos</a:t>
+              <a:t>Desafios/Superação</a:t>
             </a:r>
           </a:p>
         </p:txBody>
@@ -4774,13 +4973,362 @@
   <p:clrMapOvr>
     <a:masterClrMapping/>
   </p:clrMapOvr>
-  <mc:AlternateContent xmlns:mc="http://schemas.openxmlformats.org/markup-compatibility/2006">
-    <mc:Choice xmlns:p159="http://schemas.microsoft.com/office/powerpoint/2015/09/main" Requires="p159">
+  <mc:AlternateContent xmlns:mc="http://schemas.openxmlformats.org/markup-compatibility/2006" xmlns:p159="http://schemas.microsoft.com/office/powerpoint/2015/09/main">
+    <mc:Choice Requires="p159">
       <p:transition xmlns:p14="http://schemas.microsoft.com/office/powerpoint/2010/main" spd="slow" p14:dur="2000">
         <p159:morph option="byObject"/>
       </p:transition>
     </mc:Choice>
-    <mc:Fallback>
+    <mc:Fallback xmlns="">
+      <p:transition spd="slow">
+        <p:fade/>
+      </p:transition>
+    </mc:Fallback>
+  </mc:AlternateContent>
+  <p:timing>
+    <p:tnLst>
+      <p:par>
+        <p:cTn id="1" dur="indefinite" restart="never" nodeType="tmRoot">
+          <p:childTnLst>
+            <p:seq concurrent="1" nextAc="seek">
+              <p:cTn id="2" dur="indefinite" nodeType="mainSeq">
+                <p:childTnLst>
+                  <p:par>
+                    <p:cTn id="3" fill="hold">
+                      <p:stCondLst>
+                        <p:cond delay="indefinite"/>
+                      </p:stCondLst>
+                      <p:childTnLst>
+                        <p:par>
+                          <p:cTn id="4" fill="hold">
+                            <p:stCondLst>
+                              <p:cond delay="0"/>
+                            </p:stCondLst>
+                            <p:childTnLst>
+                              <p:par>
+                                <p:cTn id="5" presetID="53" presetClass="entr" presetSubtype="16" fill="hold" grpId="0" nodeType="clickEffect">
+                                  <p:stCondLst>
+                                    <p:cond delay="0"/>
+                                  </p:stCondLst>
+                                  <p:childTnLst>
+                                    <p:set>
+                                      <p:cBhvr>
+                                        <p:cTn id="6" dur="1" fill="hold">
+                                          <p:stCondLst>
+                                            <p:cond delay="0"/>
+                                          </p:stCondLst>
+                                        </p:cTn>
+                                        <p:tgtEl>
+                                          <p:spTgt spid="5"/>
+                                        </p:tgtEl>
+                                        <p:attrNameLst>
+                                          <p:attrName>style.visibility</p:attrName>
+                                        </p:attrNameLst>
+                                      </p:cBhvr>
+                                      <p:to>
+                                        <p:strVal val="visible"/>
+                                      </p:to>
+                                    </p:set>
+                                    <p:anim calcmode="lin" valueType="num">
+                                      <p:cBhvr>
+                                        <p:cTn id="7" dur="500" fill="hold"/>
+                                        <p:tgtEl>
+                                          <p:spTgt spid="5"/>
+                                        </p:tgtEl>
+                                        <p:attrNameLst>
+                                          <p:attrName>ppt_w</p:attrName>
+                                        </p:attrNameLst>
+                                      </p:cBhvr>
+                                      <p:tavLst>
+                                        <p:tav tm="0">
+                                          <p:val>
+                                            <p:fltVal val="0"/>
+                                          </p:val>
+                                        </p:tav>
+                                        <p:tav tm="100000">
+                                          <p:val>
+                                            <p:strVal val="#ppt_w"/>
+                                          </p:val>
+                                        </p:tav>
+                                      </p:tavLst>
+                                    </p:anim>
+                                    <p:anim calcmode="lin" valueType="num">
+                                      <p:cBhvr>
+                                        <p:cTn id="8" dur="500" fill="hold"/>
+                                        <p:tgtEl>
+                                          <p:spTgt spid="5"/>
+                                        </p:tgtEl>
+                                        <p:attrNameLst>
+                                          <p:attrName>ppt_h</p:attrName>
+                                        </p:attrNameLst>
+                                      </p:cBhvr>
+                                      <p:tavLst>
+                                        <p:tav tm="0">
+                                          <p:val>
+                                            <p:fltVal val="0"/>
+                                          </p:val>
+                                        </p:tav>
+                                        <p:tav tm="100000">
+                                          <p:val>
+                                            <p:strVal val="#ppt_h"/>
+                                          </p:val>
+                                        </p:tav>
+                                      </p:tavLst>
+                                    </p:anim>
+                                    <p:animEffect transition="in" filter="fade">
+                                      <p:cBhvr>
+                                        <p:cTn id="9" dur="500"/>
+                                        <p:tgtEl>
+                                          <p:spTgt spid="5"/>
+                                        </p:tgtEl>
+                                      </p:cBhvr>
+                                    </p:animEffect>
+                                  </p:childTnLst>
+                                </p:cTn>
+                              </p:par>
+                            </p:childTnLst>
+                          </p:cTn>
+                        </p:par>
+                      </p:childTnLst>
+                    </p:cTn>
+                  </p:par>
+                </p:childTnLst>
+              </p:cTn>
+              <p:prevCondLst>
+                <p:cond evt="onPrev" delay="0">
+                  <p:tgtEl>
+                    <p:sldTgt/>
+                  </p:tgtEl>
+                </p:cond>
+              </p:prevCondLst>
+              <p:nextCondLst>
+                <p:cond evt="onNext" delay="0">
+                  <p:tgtEl>
+                    <p:sldTgt/>
+                  </p:tgtEl>
+                </p:cond>
+              </p:nextCondLst>
+            </p:seq>
+          </p:childTnLst>
+        </p:cTn>
+      </p:par>
+    </p:tnLst>
+    <p:bldLst>
+      <p:bldP spid="5" grpId="0"/>
+    </p:bldLst>
+  </p:timing>
+</p:sld>
+</file>
+
+<file path=ppt/slides/slide6.xml><?xml version="1.0" encoding="utf-8"?>
+<p:sld xmlns:a="http://schemas.openxmlformats.org/drawingml/2006/main" xmlns:r="http://schemas.openxmlformats.org/officeDocument/2006/relationships" xmlns:p="http://schemas.openxmlformats.org/presentationml/2006/main">
+  <p:cSld>
+    <p:spTree>
+      <p:nvGrpSpPr>
+        <p:cNvPr id="1" name=""/>
+        <p:cNvGrpSpPr/>
+        <p:nvPr/>
+      </p:nvGrpSpPr>
+      <p:grpSpPr>
+        <a:xfrm>
+          <a:off x="0" y="0"/>
+          <a:ext cx="0" cy="0"/>
+          <a:chOff x="0" y="0"/>
+          <a:chExt cx="0" cy="0"/>
+        </a:xfrm>
+      </p:grpSpPr>
+      <p:sp>
+        <p:nvSpPr>
+          <p:cNvPr id="21" name="Triângulo Retângulo 20">
+            <a:extLst>
+              <a:ext uri="{FF2B5EF4-FFF2-40B4-BE49-F238E27FC236}">
+                <a16:creationId xmlns:a16="http://schemas.microsoft.com/office/drawing/2014/main" id="{6965477F-7B10-D4F6-7623-CE0A79B61379}"/>
+              </a:ext>
+            </a:extLst>
+          </p:cNvPr>
+          <p:cNvSpPr/>
+          <p:nvPr/>
+        </p:nvSpPr>
+        <p:spPr>
+          <a:xfrm>
+            <a:off x="0" y="3922643"/>
+            <a:ext cx="1258957" cy="2935357"/>
+          </a:xfrm>
+          <a:prstGeom prst="rtTriangle">
+            <a:avLst/>
+          </a:prstGeom>
+          <a:gradFill flip="none" rotWithShape="1">
+            <a:gsLst>
+              <a:gs pos="0">
+                <a:schemeClr val="dk1">
+                  <a:lumMod val="67000"/>
+                </a:schemeClr>
+              </a:gs>
+              <a:gs pos="48000">
+                <a:schemeClr val="dk1">
+                  <a:lumMod val="97000"/>
+                  <a:lumOff val="3000"/>
+                </a:schemeClr>
+              </a:gs>
+              <a:gs pos="100000">
+                <a:schemeClr val="dk1">
+                  <a:lumMod val="60000"/>
+                  <a:lumOff val="40000"/>
+                </a:schemeClr>
+              </a:gs>
+            </a:gsLst>
+            <a:lin ang="16200000" scaled="1"/>
+            <a:tileRect/>
+          </a:gradFill>
+          <a:ln>
+            <a:noFill/>
+          </a:ln>
+        </p:spPr>
+        <p:style>
+          <a:lnRef idx="0">
+            <a:scrgbClr r="0" g="0" b="0"/>
+          </a:lnRef>
+          <a:fillRef idx="0">
+            <a:scrgbClr r="0" g="0" b="0"/>
+          </a:fillRef>
+          <a:effectRef idx="0">
+            <a:scrgbClr r="0" g="0" b="0"/>
+          </a:effectRef>
+          <a:fontRef idx="minor">
+            <a:schemeClr val="lt1"/>
+          </a:fontRef>
+        </p:style>
+        <p:txBody>
+          <a:bodyPr rtlCol="0" anchor="ctr"/>
+          <a:lstStyle/>
+          <a:p>
+            <a:pPr algn="ctr"/>
+            <a:endParaRPr lang="pt-BR"/>
+          </a:p>
+        </p:txBody>
+      </p:sp>
+      <p:sp>
+        <p:nvSpPr>
+          <p:cNvPr id="75" name="Triângulo Retângulo 74">
+            <a:extLst>
+              <a:ext uri="{FF2B5EF4-FFF2-40B4-BE49-F238E27FC236}">
+                <a16:creationId xmlns:a16="http://schemas.microsoft.com/office/drawing/2014/main" id="{61596A8B-4C7C-8B66-05B0-A2BDCE7558A2}"/>
+              </a:ext>
+            </a:extLst>
+          </p:cNvPr>
+          <p:cNvSpPr/>
+          <p:nvPr/>
+        </p:nvSpPr>
+        <p:spPr>
+          <a:xfrm rot="10800000">
+            <a:off x="10959547" y="-1"/>
+            <a:ext cx="1232452" cy="2994991"/>
+          </a:xfrm>
+          <a:prstGeom prst="rtTriangle">
+            <a:avLst/>
+          </a:prstGeom>
+          <a:gradFill flip="none" rotWithShape="1">
+            <a:gsLst>
+              <a:gs pos="0">
+                <a:schemeClr val="dk1">
+                  <a:lumMod val="67000"/>
+                </a:schemeClr>
+              </a:gs>
+              <a:gs pos="48000">
+                <a:schemeClr val="dk1">
+                  <a:lumMod val="97000"/>
+                  <a:lumOff val="3000"/>
+                </a:schemeClr>
+              </a:gs>
+              <a:gs pos="100000">
+                <a:schemeClr val="dk1">
+                  <a:lumMod val="60000"/>
+                  <a:lumOff val="40000"/>
+                </a:schemeClr>
+              </a:gs>
+            </a:gsLst>
+            <a:lin ang="16200000" scaled="1"/>
+            <a:tileRect/>
+          </a:gradFill>
+          <a:ln>
+            <a:noFill/>
+          </a:ln>
+        </p:spPr>
+        <p:style>
+          <a:lnRef idx="0">
+            <a:scrgbClr r="0" g="0" b="0"/>
+          </a:lnRef>
+          <a:fillRef idx="0">
+            <a:scrgbClr r="0" g="0" b="0"/>
+          </a:fillRef>
+          <a:effectRef idx="0">
+            <a:scrgbClr r="0" g="0" b="0"/>
+          </a:effectRef>
+          <a:fontRef idx="minor">
+            <a:schemeClr val="lt1"/>
+          </a:fontRef>
+        </p:style>
+        <p:txBody>
+          <a:bodyPr rtlCol="0" anchor="ctr"/>
+          <a:lstStyle/>
+          <a:p>
+            <a:pPr algn="ctr"/>
+            <a:endParaRPr lang="pt-BR"/>
+          </a:p>
+        </p:txBody>
+      </p:sp>
+      <p:sp>
+        <p:nvSpPr>
+          <p:cNvPr id="5" name="CaixaDeTexto 4">
+            <a:extLst>
+              <a:ext uri="{FF2B5EF4-FFF2-40B4-BE49-F238E27FC236}">
+                <a16:creationId xmlns:a16="http://schemas.microsoft.com/office/drawing/2014/main" id="{C871C67E-A345-6582-7F27-D1EC21D338F6}"/>
+              </a:ext>
+            </a:extLst>
+          </p:cNvPr>
+          <p:cNvSpPr txBox="1"/>
+          <p:nvPr/>
+        </p:nvSpPr>
+        <p:spPr>
+          <a:xfrm>
+            <a:off x="4055165" y="2994990"/>
+            <a:ext cx="4081669" cy="769441"/>
+          </a:xfrm>
+          <a:prstGeom prst="rect">
+            <a:avLst/>
+          </a:prstGeom>
+          <a:noFill/>
+        </p:spPr>
+        <p:txBody>
+          <a:bodyPr wrap="square" rtlCol="0">
+            <a:spAutoFit/>
+          </a:bodyPr>
+          <a:lstStyle/>
+          <a:p>
+            <a:r>
+              <a:rPr lang="pt-BR" sz="4400" dirty="0"/>
+              <a:t>Agradecimentos</a:t>
+            </a:r>
+          </a:p>
+        </p:txBody>
+      </p:sp>
+    </p:spTree>
+    <p:extLst>
+      <p:ext uri="{BB962C8B-B14F-4D97-AF65-F5344CB8AC3E}">
+        <p14:creationId xmlns:p14="http://schemas.microsoft.com/office/powerpoint/2010/main" val="1585085593"/>
+      </p:ext>
+    </p:extLst>
+  </p:cSld>
+  <p:clrMapOvr>
+    <a:masterClrMapping/>
+  </p:clrMapOvr>
+  <mc:AlternateContent xmlns:mc="http://schemas.openxmlformats.org/markup-compatibility/2006" xmlns:p159="http://schemas.microsoft.com/office/powerpoint/2015/09/main">
+    <mc:Choice Requires="p159">
+      <p:transition xmlns:p14="http://schemas.microsoft.com/office/powerpoint/2010/main" spd="slow" p14:dur="2000">
+        <p159:morph option="byObject"/>
+      </p:transition>
+    </mc:Choice>
+    <mc:Fallback xmlns="">
       <p:transition spd="slow">
         <p:fade/>
       </p:transition>

</xml_diff>